<commit_message>
Deployed 56d8e49 with MkDocs version: 1.3.1
</commit_message>
<xml_diff>
--- a/aulas/15-efeitos-colaterais/slides.pptx
+++ b/aulas/15-efeitos-colaterais/slides.pptx
@@ -8161,15 +8161,15 @@
               <a:buNone/>
             </a:pPr>
             <a:r>
-              <a:rPr lang="pt-BR" sz="1200" dirty="0"/>
+              <a:rPr lang="pt-BR" sz="1400" dirty="0"/>
               <a:t>#include &lt;</a:t>
             </a:r>
             <a:r>
-              <a:rPr lang="pt-BR" sz="1200" dirty="0" err="1"/>
+              <a:rPr lang="pt-BR" sz="1400" dirty="0" err="1"/>
               <a:t>omp.h</a:t>
             </a:r>
             <a:r>
-              <a:rPr lang="pt-BR" sz="1200" dirty="0"/>
+              <a:rPr lang="pt-BR" sz="1400" dirty="0"/>
               <a:t>&gt;</a:t>
             </a:r>
           </a:p>
@@ -8178,7 +8178,7 @@
               <a:buNone/>
             </a:pPr>
             <a:r>
-              <a:rPr lang="pt-BR" sz="1200" dirty="0"/>
+              <a:rPr lang="pt-BR" sz="1400" dirty="0"/>
               <a:t>#define N 1000</a:t>
             </a:r>
           </a:p>
@@ -8187,19 +8187,19 @@
               <a:buNone/>
             </a:pPr>
             <a:r>
-              <a:rPr lang="pt-BR" sz="1200" dirty="0" err="1"/>
+              <a:rPr lang="pt-BR" sz="1400" dirty="0" err="1"/>
               <a:t>int</a:t>
             </a:r>
             <a:r>
-              <a:rPr lang="pt-BR" sz="1200" dirty="0"/>
+              <a:rPr lang="pt-BR" sz="1400" dirty="0"/>
               <a:t> </a:t>
             </a:r>
             <a:r>
-              <a:rPr lang="pt-BR" sz="1200" dirty="0" err="1"/>
+              <a:rPr lang="pt-BR" sz="1400" dirty="0" err="1"/>
               <a:t>main</a:t>
             </a:r>
             <a:r>
-              <a:rPr lang="pt-BR" sz="1200" dirty="0"/>
+              <a:rPr lang="pt-BR" sz="1400" dirty="0"/>
               <a:t> () {</a:t>
             </a:r>
           </a:p>
@@ -8208,27 +8208,27 @@
               <a:buNone/>
             </a:pPr>
             <a:r>
-              <a:rPr lang="pt-BR" sz="1200" dirty="0" err="1"/>
+              <a:rPr lang="pt-BR" sz="1400" dirty="0" err="1"/>
               <a:t>int</a:t>
             </a:r>
             <a:r>
-              <a:rPr lang="pt-BR" sz="1200" dirty="0"/>
+              <a:rPr lang="pt-BR" sz="1400" dirty="0"/>
               <a:t> </a:t>
             </a:r>
             <a:r>
-              <a:rPr lang="pt-BR" sz="1200" dirty="0" err="1"/>
+              <a:rPr lang="pt-BR" sz="1400" dirty="0" err="1"/>
               <a:t>i</a:t>
             </a:r>
             <a:r>
-              <a:rPr lang="pt-BR" sz="1200" dirty="0"/>
+              <a:rPr lang="pt-BR" sz="1400" dirty="0"/>
               <a:t>, </a:t>
             </a:r>
             <a:r>
-              <a:rPr lang="pt-BR" sz="1200" dirty="0" err="1"/>
+              <a:rPr lang="pt-BR" sz="1400" dirty="0" err="1"/>
               <a:t>n</a:t>
             </a:r>
             <a:r>
-              <a:rPr lang="pt-BR" sz="1200" dirty="0"/>
+              <a:rPr lang="pt-BR" sz="1400" dirty="0"/>
               <a:t>=N;</a:t>
             </a:r>
           </a:p>
@@ -8237,27 +8237,27 @@
               <a:buNone/>
             </a:pPr>
             <a:r>
-              <a:rPr lang="pt-BR" sz="1200" dirty="0" err="1"/>
+              <a:rPr lang="pt-BR" sz="1400" dirty="0" err="1"/>
               <a:t>float</a:t>
             </a:r>
             <a:r>
-              <a:rPr lang="pt-BR" sz="1200" dirty="0"/>
+              <a:rPr lang="pt-BR" sz="1400" dirty="0"/>
               <a:t> a[N], </a:t>
             </a:r>
             <a:r>
-              <a:rPr lang="pt-BR" sz="1200" dirty="0" err="1"/>
+              <a:rPr lang="pt-BR" sz="1400" dirty="0" err="1"/>
               <a:t>b</a:t>
             </a:r>
             <a:r>
-              <a:rPr lang="pt-BR" sz="1200" dirty="0"/>
+              <a:rPr lang="pt-BR" sz="1400" dirty="0"/>
               <a:t>[N], </a:t>
             </a:r>
             <a:r>
-              <a:rPr lang="pt-BR" sz="1200" dirty="0" err="1"/>
+              <a:rPr lang="pt-BR" sz="1400" dirty="0" err="1"/>
               <a:t>c</a:t>
             </a:r>
             <a:r>
-              <a:rPr lang="pt-BR" sz="1200" dirty="0"/>
+              <a:rPr lang="pt-BR" sz="1400" dirty="0"/>
               <a:t>[N];</a:t>
             </a:r>
           </a:p>
@@ -8266,63 +8266,63 @@
               <a:buNone/>
             </a:pPr>
             <a:r>
-              <a:rPr lang="pt-BR" sz="1200" dirty="0"/>
+              <a:rPr lang="pt-BR" sz="1400" dirty="0"/>
               <a:t>for (</a:t>
             </a:r>
             <a:r>
-              <a:rPr lang="pt-BR" sz="1200" dirty="0" err="1"/>
+              <a:rPr lang="pt-BR" sz="1400" dirty="0" err="1"/>
               <a:t>i</a:t>
             </a:r>
             <a:r>
-              <a:rPr lang="pt-BR" sz="1200" dirty="0"/>
+              <a:rPr lang="pt-BR" sz="1400" dirty="0"/>
               <a:t>=0; </a:t>
             </a:r>
             <a:r>
-              <a:rPr lang="pt-BR" sz="1200" dirty="0" err="1"/>
+              <a:rPr lang="pt-BR" sz="1400" dirty="0" err="1"/>
               <a:t>i</a:t>
             </a:r>
             <a:r>
-              <a:rPr lang="pt-BR" sz="1200" dirty="0"/>
+              <a:rPr lang="pt-BR" sz="1400" dirty="0"/>
               <a:t> &lt; N; </a:t>
             </a:r>
             <a:r>
-              <a:rPr lang="pt-BR" sz="1200" dirty="0" err="1"/>
+              <a:rPr lang="pt-BR" sz="1400" dirty="0" err="1"/>
               <a:t>i</a:t>
             </a:r>
             <a:r>
-              <a:rPr lang="pt-BR" sz="1200" dirty="0"/>
+              <a:rPr lang="pt-BR" sz="1400" dirty="0"/>
               <a:t>++) a[</a:t>
             </a:r>
             <a:r>
-              <a:rPr lang="pt-BR" sz="1200" dirty="0" err="1"/>
+              <a:rPr lang="pt-BR" sz="1400" dirty="0" err="1"/>
               <a:t>i</a:t>
             </a:r>
             <a:r>
-              <a:rPr lang="pt-BR" sz="1200" dirty="0"/>
+              <a:rPr lang="pt-BR" sz="1400" dirty="0"/>
               <a:t>] = </a:t>
             </a:r>
             <a:r>
-              <a:rPr lang="pt-BR" sz="1200" dirty="0" err="1"/>
+              <a:rPr lang="pt-BR" sz="1400" dirty="0" err="1"/>
               <a:t>b</a:t>
             </a:r>
             <a:r>
-              <a:rPr lang="pt-BR" sz="1200" dirty="0"/>
+              <a:rPr lang="pt-BR" sz="1400" dirty="0"/>
               <a:t>[</a:t>
             </a:r>
             <a:r>
-              <a:rPr lang="pt-BR" sz="1200" dirty="0" err="1"/>
+              <a:rPr lang="pt-BR" sz="1400" dirty="0" err="1"/>
               <a:t>i</a:t>
             </a:r>
             <a:r>
-              <a:rPr lang="pt-BR" sz="1200" dirty="0"/>
+              <a:rPr lang="pt-BR" sz="1400" dirty="0"/>
               <a:t>] = </a:t>
             </a:r>
             <a:r>
-              <a:rPr lang="pt-BR" sz="1200" dirty="0" err="1"/>
+              <a:rPr lang="pt-BR" sz="1400" dirty="0" err="1"/>
               <a:t>i</a:t>
             </a:r>
             <a:r>
-              <a:rPr lang="pt-BR" sz="1200" dirty="0"/>
+              <a:rPr lang="pt-BR" sz="1400" dirty="0"/>
               <a:t> * 1.0;</a:t>
             </a:r>
           </a:p>
@@ -8331,7 +8331,7 @@
               <a:buNone/>
             </a:pPr>
             <a:r>
-              <a:rPr lang="pt-BR" sz="1200" dirty="0">
+              <a:rPr lang="pt-BR" sz="1400" dirty="0">
                 <a:solidFill>
                   <a:srgbClr val="002060"/>
                 </a:solidFill>
@@ -8339,7 +8339,7 @@
               <a:t>#</a:t>
             </a:r>
             <a:r>
-              <a:rPr lang="pt-BR" sz="1200" dirty="0" err="1">
+              <a:rPr lang="pt-BR" sz="1400" dirty="0" err="1">
                 <a:solidFill>
                   <a:srgbClr val="002060"/>
                 </a:solidFill>
@@ -8347,7 +8347,7 @@
               <a:t>pragma</a:t>
             </a:r>
             <a:r>
-              <a:rPr lang="pt-BR" sz="1200" dirty="0">
+              <a:rPr lang="pt-BR" sz="1400" dirty="0">
                 <a:solidFill>
                   <a:srgbClr val="002060"/>
                 </a:solidFill>
@@ -8355,7 +8355,7 @@
               <a:t> </a:t>
             </a:r>
             <a:r>
-              <a:rPr lang="pt-BR" sz="1200" dirty="0" err="1">
+              <a:rPr lang="pt-BR" sz="1400" dirty="0" err="1">
                 <a:solidFill>
                   <a:srgbClr val="002060"/>
                 </a:solidFill>
@@ -8363,7 +8363,7 @@
               <a:t>omp</a:t>
             </a:r>
             <a:r>
-              <a:rPr lang="pt-BR" sz="1200" dirty="0">
+              <a:rPr lang="pt-BR" sz="1400" dirty="0">
                 <a:solidFill>
                   <a:srgbClr val="002060"/>
                 </a:solidFill>
@@ -8371,7 +8371,7 @@
               <a:t> </a:t>
             </a:r>
             <a:r>
-              <a:rPr lang="pt-BR" sz="1200" dirty="0" err="1">
+              <a:rPr lang="pt-BR" sz="1400" dirty="0" err="1">
                 <a:solidFill>
                   <a:srgbClr val="002060"/>
                 </a:solidFill>
@@ -8379,7 +8379,7 @@
               <a:t>parallel</a:t>
             </a:r>
             <a:r>
-              <a:rPr lang="pt-BR" sz="1200" dirty="0">
+              <a:rPr lang="pt-BR" sz="1400" dirty="0">
                 <a:solidFill>
                   <a:srgbClr val="002060"/>
                 </a:solidFill>
@@ -8387,7 +8387,7 @@
               <a:t> </a:t>
             </a:r>
             <a:r>
-              <a:rPr lang="pt-BR" sz="1200" dirty="0" err="1">
+              <a:rPr lang="pt-BR" sz="1400" dirty="0" err="1">
                 <a:solidFill>
                   <a:srgbClr val="002060"/>
                 </a:solidFill>
@@ -8395,7 +8395,7 @@
               <a:t>shared</a:t>
             </a:r>
             <a:r>
-              <a:rPr lang="pt-BR" sz="1200" dirty="0">
+              <a:rPr lang="pt-BR" sz="1400" dirty="0">
                 <a:solidFill>
                   <a:srgbClr val="002060"/>
                 </a:solidFill>
@@ -8403,7 +8403,7 @@
               <a:t>(</a:t>
             </a:r>
             <a:r>
-              <a:rPr lang="pt-BR" sz="1200" dirty="0" err="1">
+              <a:rPr lang="pt-BR" sz="1400" dirty="0" err="1">
                 <a:solidFill>
                   <a:srgbClr val="002060"/>
                 </a:solidFill>
@@ -8411,7 +8411,7 @@
               <a:t>a,b,c,n</a:t>
             </a:r>
             <a:r>
-              <a:rPr lang="pt-BR" sz="1200" dirty="0">
+              <a:rPr lang="pt-BR" sz="1400" dirty="0">
                 <a:solidFill>
                   <a:srgbClr val="002060"/>
                 </a:solidFill>
@@ -8419,7 +8419,7 @@
               <a:t>) </a:t>
             </a:r>
             <a:r>
-              <a:rPr lang="pt-BR" sz="1200" dirty="0" err="1">
+              <a:rPr lang="pt-BR" sz="1400" dirty="0" err="1">
                 <a:solidFill>
                   <a:srgbClr val="002060"/>
                 </a:solidFill>
@@ -8427,7 +8427,7 @@
               <a:t>private</a:t>
             </a:r>
             <a:r>
-              <a:rPr lang="pt-BR" sz="1200" dirty="0">
+              <a:rPr lang="pt-BR" sz="1400" dirty="0">
                 <a:solidFill>
                   <a:srgbClr val="002060"/>
                 </a:solidFill>
@@ -8435,7 +8435,7 @@
               <a:t>(</a:t>
             </a:r>
             <a:r>
-              <a:rPr lang="pt-BR" sz="1200" dirty="0" err="1">
+              <a:rPr lang="pt-BR" sz="1400" dirty="0" err="1">
                 <a:solidFill>
                   <a:srgbClr val="002060"/>
                 </a:solidFill>
@@ -8443,12 +8443,12 @@
               <a:t>i</a:t>
             </a:r>
             <a:r>
-              <a:rPr lang="pt-BR" sz="1200" dirty="0">
+              <a:rPr lang="pt-BR" sz="1400" dirty="0">
                 <a:solidFill>
                   <a:srgbClr val="002060"/>
                 </a:solidFill>
               </a:rPr>
-              <a:t>)</a:t>
+              <a:t>) {</a:t>
             </a:r>
           </a:p>
           <a:p>
@@ -8456,12 +8456,76 @@
               <a:buNone/>
             </a:pPr>
             <a:r>
-              <a:rPr lang="pt-BR" sz="1200" dirty="0">
+              <a:rPr lang="pt-BR" sz="1400" dirty="0">
                 <a:solidFill>
                   <a:srgbClr val="002060"/>
                 </a:solidFill>
               </a:rPr>
-              <a:t>{</a:t>
+              <a:t>#</a:t>
+            </a:r>
+            <a:r>
+              <a:rPr lang="pt-BR" sz="1400" dirty="0" err="1">
+                <a:solidFill>
+                  <a:srgbClr val="002060"/>
+                </a:solidFill>
+              </a:rPr>
+              <a:t>pragma</a:t>
+            </a:r>
+            <a:r>
+              <a:rPr lang="pt-BR" sz="1400" dirty="0">
+                <a:solidFill>
+                  <a:srgbClr val="002060"/>
+                </a:solidFill>
+              </a:rPr>
+              <a:t> </a:t>
+            </a:r>
+            <a:r>
+              <a:rPr lang="pt-BR" sz="1400" dirty="0" err="1">
+                <a:solidFill>
+                  <a:srgbClr val="002060"/>
+                </a:solidFill>
+              </a:rPr>
+              <a:t>omp</a:t>
+            </a:r>
+            <a:r>
+              <a:rPr lang="pt-BR" sz="1400" dirty="0">
+                <a:solidFill>
+                  <a:srgbClr val="002060"/>
+                </a:solidFill>
+              </a:rPr>
+              <a:t> </a:t>
+            </a:r>
+            <a:r>
+              <a:rPr lang="pt-BR" sz="1400" dirty="0" err="1">
+                <a:solidFill>
+                  <a:srgbClr val="002060"/>
+                </a:solidFill>
+              </a:rPr>
+              <a:t>sections</a:t>
+            </a:r>
+            <a:r>
+              <a:rPr lang="pt-BR" sz="1400" dirty="0">
+                <a:solidFill>
+                  <a:srgbClr val="002060"/>
+                </a:solidFill>
+              </a:rPr>
+              <a:t> </a:t>
+            </a:r>
+            <a:r>
+              <a:rPr lang="pt-BR" sz="1400" dirty="0" err="1">
+                <a:solidFill>
+                  <a:srgbClr val="002060"/>
+                </a:solidFill>
+              </a:rPr>
+              <a:t>nowait</a:t>
+            </a:r>
+            <a:r>
+              <a:rPr lang="pt-BR" sz="1400" dirty="0">
+                <a:solidFill>
+                  <a:srgbClr val="002060"/>
+                </a:solidFill>
+              </a:rPr>
+              <a:t> {</a:t>
             </a:r>
           </a:p>
           <a:p>
@@ -8469,15 +8533,15 @@
               <a:buNone/>
             </a:pPr>
             <a:r>
-              <a:rPr lang="pt-BR" sz="1200" dirty="0">
+              <a:rPr lang="pt-BR" sz="1400" dirty="0">
                 <a:solidFill>
                   <a:srgbClr val="002060"/>
                 </a:solidFill>
               </a:rPr>
-              <a:t>  #</a:t>
-            </a:r>
-            <a:r>
-              <a:rPr lang="pt-BR" sz="1200" dirty="0" err="1">
+              <a:t>#</a:t>
+            </a:r>
+            <a:r>
+              <a:rPr lang="pt-BR" sz="1400" dirty="0" err="1">
                 <a:solidFill>
                   <a:srgbClr val="002060"/>
                 </a:solidFill>
@@ -8485,7 +8549,7 @@
               <a:t>pragma</a:t>
             </a:r>
             <a:r>
-              <a:rPr lang="pt-BR" sz="1200" dirty="0">
+              <a:rPr lang="pt-BR" sz="1400" dirty="0">
                 <a:solidFill>
                   <a:srgbClr val="002060"/>
                 </a:solidFill>
@@ -8493,7 +8557,7 @@
               <a:t> </a:t>
             </a:r>
             <a:r>
-              <a:rPr lang="pt-BR" sz="1200" dirty="0" err="1">
+              <a:rPr lang="pt-BR" sz="1400" dirty="0" err="1">
                 <a:solidFill>
                   <a:srgbClr val="002060"/>
                 </a:solidFill>
@@ -8501,7 +8565,7 @@
               <a:t>omp</a:t>
             </a:r>
             <a:r>
-              <a:rPr lang="pt-BR" sz="1200" dirty="0">
+              <a:rPr lang="pt-BR" sz="1400" dirty="0">
                 <a:solidFill>
                   <a:srgbClr val="002060"/>
                 </a:solidFill>
@@ -8509,30 +8573,14 @@
               <a:t> </a:t>
             </a:r>
             <a:r>
-              <a:rPr lang="pt-BR" sz="1200" dirty="0" err="1">
+              <a:rPr lang="pt-BR" sz="1400" dirty="0" err="1">
                 <a:solidFill>
                   <a:srgbClr val="002060"/>
                 </a:solidFill>
               </a:rPr>
-              <a:t>sections</a:t>
-            </a:r>
-            <a:r>
-              <a:rPr lang="pt-BR" sz="1200" dirty="0">
-                <a:solidFill>
-                  <a:srgbClr val="002060"/>
-                </a:solidFill>
-              </a:rPr>
-              <a:t> </a:t>
-            </a:r>
-            <a:r>
-              <a:rPr lang="pt-BR" sz="1200" dirty="0" err="1">
-                <a:solidFill>
-                  <a:srgbClr val="002060"/>
-                </a:solidFill>
-              </a:rPr>
-              <a:t>nowait</a:t>
-            </a:r>
-            <a:endParaRPr lang="pt-BR" sz="1200" dirty="0">
+              <a:t>section</a:t>
+            </a:r>
+            <a:endParaRPr lang="pt-BR" sz="1400" dirty="0">
               <a:solidFill>
                 <a:srgbClr val="002060"/>
               </a:solidFill>
@@ -8543,12 +8591,40 @@
               <a:buNone/>
             </a:pPr>
             <a:r>
-              <a:rPr lang="pt-BR" sz="1200" dirty="0">
-                <a:solidFill>
-                  <a:srgbClr val="002060"/>
-                </a:solidFill>
-              </a:rPr>
-              <a:t>  {</a:t>
+              <a:rPr lang="pt-BR" sz="1400" dirty="0"/>
+              <a:t>for (</a:t>
+            </a:r>
+            <a:r>
+              <a:rPr lang="pt-BR" sz="1400" dirty="0" err="1"/>
+              <a:t>i</a:t>
+            </a:r>
+            <a:r>
+              <a:rPr lang="pt-BR" sz="1400" dirty="0"/>
+              <a:t>=0; </a:t>
+            </a:r>
+            <a:r>
+              <a:rPr lang="pt-BR" sz="1400" dirty="0" err="1"/>
+              <a:t>i</a:t>
+            </a:r>
+            <a:r>
+              <a:rPr lang="pt-BR" sz="1400" dirty="0"/>
+              <a:t> &lt; </a:t>
+            </a:r>
+            <a:r>
+              <a:rPr lang="pt-BR" sz="1400" dirty="0" err="1"/>
+              <a:t>n</a:t>
+            </a:r>
+            <a:r>
+              <a:rPr lang="pt-BR" sz="1400" dirty="0"/>
+              <a:t>/2; </a:t>
+            </a:r>
+            <a:r>
+              <a:rPr lang="pt-BR" sz="1400" dirty="0" err="1"/>
+              <a:t>i</a:t>
+            </a:r>
+            <a:r>
+              <a:rPr lang="pt-BR" sz="1400" dirty="0"/>
+              <a:t>++)</a:t>
             </a:r>
           </a:p>
           <a:p>
@@ -8556,15 +8632,64 @@
               <a:buNone/>
             </a:pPr>
             <a:r>
-              <a:rPr lang="pt-BR" sz="1200" dirty="0">
+              <a:rPr lang="pt-BR" sz="1400" dirty="0"/>
+              <a:t>       </a:t>
+            </a:r>
+            <a:r>
+              <a:rPr lang="pt-BR" sz="1400" dirty="0" err="1"/>
+              <a:t>c</a:t>
+            </a:r>
+            <a:r>
+              <a:rPr lang="pt-BR" sz="1400" dirty="0"/>
+              <a:t>[</a:t>
+            </a:r>
+            <a:r>
+              <a:rPr lang="pt-BR" sz="1400" dirty="0" err="1"/>
+              <a:t>i</a:t>
+            </a:r>
+            <a:r>
+              <a:rPr lang="pt-BR" sz="1400" dirty="0"/>
+              <a:t>] = a[</a:t>
+            </a:r>
+            <a:r>
+              <a:rPr lang="pt-BR" sz="1400" dirty="0" err="1"/>
+              <a:t>i</a:t>
+            </a:r>
+            <a:r>
+              <a:rPr lang="pt-BR" sz="1400" dirty="0"/>
+              <a:t>] + </a:t>
+            </a:r>
+            <a:r>
+              <a:rPr lang="pt-BR" sz="1400" dirty="0" err="1"/>
+              <a:t>b</a:t>
+            </a:r>
+            <a:r>
+              <a:rPr lang="pt-BR" sz="1400" dirty="0"/>
+              <a:t>[</a:t>
+            </a:r>
+            <a:r>
+              <a:rPr lang="pt-BR" sz="1400" dirty="0" err="1"/>
+              <a:t>i</a:t>
+            </a:r>
+            <a:r>
+              <a:rPr lang="pt-BR" sz="1400" dirty="0"/>
+              <a:t>];</a:t>
+            </a:r>
+          </a:p>
+          <a:p>
+            <a:pPr marL="120650" indent="0">
+              <a:buNone/>
+            </a:pPr>
+            <a:r>
+              <a:rPr lang="pt-BR" sz="1400" dirty="0">
                 <a:solidFill>
                   <a:srgbClr val="002060"/>
                 </a:solidFill>
               </a:rPr>
-              <a:t>    #</a:t>
-            </a:r>
-            <a:r>
-              <a:rPr lang="pt-BR" sz="1200" dirty="0" err="1">
+              <a:t>#</a:t>
+            </a:r>
+            <a:r>
+              <a:rPr lang="pt-BR" sz="1400" dirty="0" err="1">
                 <a:solidFill>
                   <a:srgbClr val="002060"/>
                 </a:solidFill>
@@ -8572,7 +8697,7 @@
               <a:t>pragma</a:t>
             </a:r>
             <a:r>
-              <a:rPr lang="pt-BR" sz="1200" dirty="0">
+              <a:rPr lang="pt-BR" sz="1400" dirty="0">
                 <a:solidFill>
                   <a:srgbClr val="002060"/>
                 </a:solidFill>
@@ -8580,7 +8705,7 @@
               <a:t> </a:t>
             </a:r>
             <a:r>
-              <a:rPr lang="pt-BR" sz="1200" dirty="0" err="1">
+              <a:rPr lang="pt-BR" sz="1400" dirty="0" err="1">
                 <a:solidFill>
                   <a:srgbClr val="002060"/>
                 </a:solidFill>
@@ -8588,7 +8713,7 @@
               <a:t>omp</a:t>
             </a:r>
             <a:r>
-              <a:rPr lang="pt-BR" sz="1200" dirty="0">
+              <a:rPr lang="pt-BR" sz="1400" dirty="0">
                 <a:solidFill>
                   <a:srgbClr val="002060"/>
                 </a:solidFill>
@@ -8596,14 +8721,14 @@
               <a:t> </a:t>
             </a:r>
             <a:r>
-              <a:rPr lang="pt-BR" sz="1200" dirty="0" err="1">
+              <a:rPr lang="pt-BR" sz="1400" dirty="0" err="1">
                 <a:solidFill>
                   <a:srgbClr val="002060"/>
                 </a:solidFill>
               </a:rPr>
               <a:t>section</a:t>
             </a:r>
-            <a:endParaRPr lang="pt-BR" sz="1200" dirty="0">
+            <a:endParaRPr lang="pt-BR" sz="1400" dirty="0">
               <a:solidFill>
                 <a:srgbClr val="002060"/>
               </a:solidFill>
@@ -8614,39 +8739,47 @@
               <a:buNone/>
             </a:pPr>
             <a:r>
-              <a:rPr lang="pt-BR" sz="1200" dirty="0"/>
-              <a:t>     for (</a:t>
-            </a:r>
-            <a:r>
-              <a:rPr lang="pt-BR" sz="1200" dirty="0" err="1"/>
+              <a:rPr lang="pt-BR" sz="1400" dirty="0"/>
+              <a:t>for (</a:t>
+            </a:r>
+            <a:r>
+              <a:rPr lang="pt-BR" sz="1400" dirty="0" err="1"/>
               <a:t>i</a:t>
             </a:r>
             <a:r>
-              <a:rPr lang="pt-BR" sz="1200" dirty="0"/>
-              <a:t>=0; </a:t>
-            </a:r>
-            <a:r>
-              <a:rPr lang="pt-BR" sz="1200" dirty="0" err="1"/>
+              <a:rPr lang="pt-BR" sz="1400" dirty="0"/>
+              <a:t>=</a:t>
+            </a:r>
+            <a:r>
+              <a:rPr lang="pt-BR" sz="1400" dirty="0" err="1"/>
+              <a:t>n</a:t>
+            </a:r>
+            <a:r>
+              <a:rPr lang="pt-BR" sz="1400" dirty="0"/>
+              <a:t>/2; </a:t>
+            </a:r>
+            <a:r>
+              <a:rPr lang="pt-BR" sz="1400" dirty="0" err="1"/>
               <a:t>i</a:t>
             </a:r>
             <a:r>
-              <a:rPr lang="pt-BR" sz="1200" dirty="0"/>
+              <a:rPr lang="pt-BR" sz="1400" dirty="0"/>
               <a:t> &lt; </a:t>
             </a:r>
             <a:r>
-              <a:rPr lang="pt-BR" sz="1200" dirty="0" err="1"/>
+              <a:rPr lang="pt-BR" sz="1400" dirty="0" err="1"/>
               <a:t>n</a:t>
             </a:r>
             <a:r>
-              <a:rPr lang="pt-BR" sz="1200" dirty="0"/>
-              <a:t>/2; </a:t>
-            </a:r>
-            <a:r>
-              <a:rPr lang="pt-BR" sz="1200" dirty="0" err="1"/>
+              <a:rPr lang="pt-BR" sz="1400" dirty="0"/>
+              <a:t>; </a:t>
+            </a:r>
+            <a:r>
+              <a:rPr lang="pt-BR" sz="1400" dirty="0" err="1"/>
               <a:t>i</a:t>
             </a:r>
             <a:r>
-              <a:rPr lang="pt-BR" sz="1200" dirty="0"/>
+              <a:rPr lang="pt-BR" sz="1400" dirty="0"/>
               <a:t>++)</a:t>
             </a:r>
           </a:p>
@@ -8655,47 +8788,47 @@
               <a:buNone/>
             </a:pPr>
             <a:r>
-              <a:rPr lang="pt-BR" sz="1200" dirty="0"/>
-              <a:t>        </a:t>
-            </a:r>
-            <a:r>
-              <a:rPr lang="pt-BR" sz="1200" dirty="0" err="1"/>
+              <a:rPr lang="pt-BR" sz="1400" dirty="0"/>
+              <a:t>	</a:t>
+            </a:r>
+            <a:r>
+              <a:rPr lang="pt-BR" sz="1400" dirty="0" err="1"/>
               <a:t>c</a:t>
             </a:r>
             <a:r>
-              <a:rPr lang="pt-BR" sz="1200" dirty="0"/>
+              <a:rPr lang="pt-BR" sz="1400" dirty="0"/>
               <a:t>[</a:t>
             </a:r>
             <a:r>
-              <a:rPr lang="pt-BR" sz="1200" dirty="0" err="1"/>
+              <a:rPr lang="pt-BR" sz="1400" dirty="0" err="1"/>
               <a:t>i</a:t>
             </a:r>
             <a:r>
-              <a:rPr lang="pt-BR" sz="1200" dirty="0"/>
+              <a:rPr lang="pt-BR" sz="1400" dirty="0"/>
               <a:t>] = a[</a:t>
             </a:r>
             <a:r>
-              <a:rPr lang="pt-BR" sz="1200" dirty="0" err="1"/>
+              <a:rPr lang="pt-BR" sz="1400" dirty="0" err="1"/>
               <a:t>i</a:t>
             </a:r>
             <a:r>
-              <a:rPr lang="pt-BR" sz="1200" dirty="0"/>
+              <a:rPr lang="pt-BR" sz="1400" dirty="0"/>
               <a:t>] + </a:t>
             </a:r>
             <a:r>
-              <a:rPr lang="pt-BR" sz="1200" dirty="0" err="1"/>
+              <a:rPr lang="pt-BR" sz="1400" dirty="0" err="1"/>
               <a:t>b</a:t>
             </a:r>
             <a:r>
-              <a:rPr lang="pt-BR" sz="1200" dirty="0"/>
+              <a:rPr lang="pt-BR" sz="1400" dirty="0"/>
               <a:t>[</a:t>
             </a:r>
             <a:r>
-              <a:rPr lang="pt-BR" sz="1200" dirty="0" err="1"/>
+              <a:rPr lang="pt-BR" sz="1400" dirty="0" err="1"/>
               <a:t>i</a:t>
             </a:r>
             <a:r>
-              <a:rPr lang="pt-BR" sz="1200" dirty="0"/>
+              <a:rPr lang="pt-BR" sz="1400" dirty="0"/>
               <a:t>];</a:t>
             </a:r>
           </a:p>
@@ -8704,106 +8837,25 @@
               <a:buNone/>
             </a:pPr>
             <a:r>
-              <a:rPr lang="pt-BR" sz="1200" dirty="0">
-                <a:solidFill>
-                  <a:srgbClr val="002060"/>
-                </a:solidFill>
-              </a:rPr>
-              <a:t>     #</a:t>
-            </a:r>
-            <a:r>
-              <a:rPr lang="pt-BR" sz="1200" dirty="0" err="1">
-                <a:solidFill>
-                  <a:srgbClr val="002060"/>
-                </a:solidFill>
-              </a:rPr>
-              <a:t>pragma</a:t>
-            </a:r>
-            <a:r>
-              <a:rPr lang="pt-BR" sz="1200" dirty="0">
-                <a:solidFill>
-                  <a:srgbClr val="002060"/>
-                </a:solidFill>
-              </a:rPr>
-              <a:t> </a:t>
-            </a:r>
-            <a:r>
-              <a:rPr lang="pt-BR" sz="1200" dirty="0" err="1">
-                <a:solidFill>
-                  <a:srgbClr val="002060"/>
-                </a:solidFill>
-              </a:rPr>
-              <a:t>omp</a:t>
-            </a:r>
-            <a:r>
-              <a:rPr lang="pt-BR" sz="1200" dirty="0">
-                <a:solidFill>
-                  <a:srgbClr val="002060"/>
-                </a:solidFill>
-              </a:rPr>
-              <a:t> </a:t>
-            </a:r>
-            <a:r>
-              <a:rPr lang="pt-BR" sz="1200" dirty="0" err="1">
-                <a:solidFill>
-                  <a:srgbClr val="002060"/>
-                </a:solidFill>
-              </a:rPr>
-              <a:t>section</a:t>
-            </a:r>
-            <a:endParaRPr lang="pt-BR" sz="1200" dirty="0">
-              <a:solidFill>
-                <a:srgbClr val="002060"/>
-              </a:solidFill>
-            </a:endParaRPr>
+              <a:rPr lang="pt-BR" sz="1400" dirty="0"/>
+              <a:t>} /* fim seções*/</a:t>
+            </a:r>
           </a:p>
           <a:p>
             <a:pPr marL="120650" indent="0">
               <a:buNone/>
             </a:pPr>
             <a:r>
-              <a:rPr lang="pt-BR" sz="1200" dirty="0"/>
-              <a:t>     for (</a:t>
-            </a:r>
-            <a:r>
-              <a:rPr lang="pt-BR" sz="1200" dirty="0" err="1"/>
-              <a:t>i</a:t>
-            </a:r>
-            <a:r>
-              <a:rPr lang="pt-BR" sz="1200" dirty="0"/>
-              <a:t>=</a:t>
-            </a:r>
-            <a:r>
-              <a:rPr lang="pt-BR" sz="1200" dirty="0" err="1"/>
-              <a:t>n</a:t>
-            </a:r>
-            <a:r>
-              <a:rPr lang="pt-BR" sz="1200" dirty="0"/>
-              <a:t>/2; </a:t>
-            </a:r>
-            <a:r>
-              <a:rPr lang="pt-BR" sz="1200" dirty="0" err="1"/>
-              <a:t>i</a:t>
-            </a:r>
-            <a:r>
-              <a:rPr lang="pt-BR" sz="1200" dirty="0"/>
-              <a:t> &lt; </a:t>
-            </a:r>
-            <a:r>
-              <a:rPr lang="pt-BR" sz="1200" dirty="0" err="1"/>
-              <a:t>n</a:t>
-            </a:r>
-            <a:r>
-              <a:rPr lang="pt-BR" sz="1200" dirty="0"/>
-              <a:t>; </a:t>
-            </a:r>
-            <a:r>
-              <a:rPr lang="pt-BR" sz="1200" dirty="0" err="1"/>
-              <a:t>i</a:t>
-            </a:r>
-            <a:r>
-              <a:rPr lang="pt-BR" sz="1200" dirty="0"/>
-              <a:t>++)</a:t>
+              <a:rPr lang="pt-BR" sz="1400" dirty="0"/>
+              <a:t>} /* fim </a:t>
+            </a:r>
+            <a:r>
+              <a:rPr lang="pt-BR" sz="1400" dirty="0" err="1"/>
+              <a:t>parallel</a:t>
+            </a:r>
+            <a:r>
+              <a:rPr lang="pt-BR" sz="1400" dirty="0"/>
+              <a:t> */</a:t>
             </a:r>
           </a:p>
           <a:p>
@@ -8811,86 +8863,7 @@
               <a:buNone/>
             </a:pPr>
             <a:r>
-              <a:rPr lang="pt-BR" sz="1200" dirty="0"/>
-              <a:t>        </a:t>
-            </a:r>
-            <a:r>
-              <a:rPr lang="pt-BR" sz="1200" dirty="0" err="1"/>
-              <a:t>c</a:t>
-            </a:r>
-            <a:r>
-              <a:rPr lang="pt-BR" sz="1200" dirty="0"/>
-              <a:t>[</a:t>
-            </a:r>
-            <a:r>
-              <a:rPr lang="pt-BR" sz="1200" dirty="0" err="1"/>
-              <a:t>i</a:t>
-            </a:r>
-            <a:r>
-              <a:rPr lang="pt-BR" sz="1200" dirty="0"/>
-              <a:t>] = a[</a:t>
-            </a:r>
-            <a:r>
-              <a:rPr lang="pt-BR" sz="1200" dirty="0" err="1"/>
-              <a:t>i</a:t>
-            </a:r>
-            <a:r>
-              <a:rPr lang="pt-BR" sz="1200" dirty="0"/>
-              <a:t>] + </a:t>
-            </a:r>
-            <a:r>
-              <a:rPr lang="pt-BR" sz="1200" dirty="0" err="1"/>
-              <a:t>b</a:t>
-            </a:r>
-            <a:r>
-              <a:rPr lang="pt-BR" sz="1200" dirty="0"/>
-              <a:t>[</a:t>
-            </a:r>
-            <a:r>
-              <a:rPr lang="pt-BR" sz="1200" dirty="0" err="1"/>
-              <a:t>i</a:t>
-            </a:r>
-            <a:r>
-              <a:rPr lang="pt-BR" sz="1200" dirty="0"/>
-              <a:t>];</a:t>
-            </a:r>
-          </a:p>
-          <a:p>
-            <a:pPr marL="120650" indent="0">
-              <a:buNone/>
-            </a:pPr>
-            <a:r>
-              <a:rPr lang="pt-BR" sz="1200"/>
-              <a:t>    </a:t>
-            </a:r>
-            <a:r>
-              <a:rPr lang="pt-BR" sz="1200" dirty="0"/>
-              <a:t>} /* fim seções*/</a:t>
-            </a:r>
-          </a:p>
-          <a:p>
-            <a:pPr marL="120650" indent="0">
-              <a:buNone/>
-            </a:pPr>
-            <a:r>
-              <a:rPr lang="pt-BR" sz="1200" dirty="0"/>
-              <a:t>  } /* fim </a:t>
-            </a:r>
-            <a:r>
-              <a:rPr lang="pt-BR" sz="1200" dirty="0" err="1"/>
-              <a:t>parallel</a:t>
-            </a:r>
-            <a:r>
-              <a:rPr lang="pt-BR" sz="1200" dirty="0"/>
-              <a:t> */</a:t>
-            </a:r>
-          </a:p>
-          <a:p>
-            <a:pPr marL="120650" indent="0">
-              <a:buNone/>
-            </a:pPr>
-            <a:r>
-              <a:rPr lang="pt-BR" sz="1200" dirty="0"/>
+              <a:rPr lang="pt-BR" sz="1400" dirty="0"/>
               <a:t>}</a:t>
             </a:r>
           </a:p>

</xml_diff>

<commit_message>
Deployed 34f89c0 with MkDocs version: 1.4.0
</commit_message>
<xml_diff>
--- a/aulas/15-efeitos-colaterais/slides.pptx
+++ b/aulas/15-efeitos-colaterais/slides.pptx
@@ -8161,15 +8161,15 @@
               <a:buNone/>
             </a:pPr>
             <a:r>
-              <a:rPr lang="pt-BR" sz="1400" dirty="0"/>
+              <a:rPr lang="pt-BR" sz="1200" dirty="0"/>
               <a:t>#include &lt;</a:t>
             </a:r>
             <a:r>
-              <a:rPr lang="pt-BR" sz="1400" dirty="0" err="1"/>
+              <a:rPr lang="pt-BR" sz="1200" dirty="0" err="1"/>
               <a:t>omp.h</a:t>
             </a:r>
             <a:r>
-              <a:rPr lang="pt-BR" sz="1400" dirty="0"/>
+              <a:rPr lang="pt-BR" sz="1200" dirty="0"/>
               <a:t>&gt;</a:t>
             </a:r>
           </a:p>
@@ -8178,7 +8178,7 @@
               <a:buNone/>
             </a:pPr>
             <a:r>
-              <a:rPr lang="pt-BR" sz="1400" dirty="0"/>
+              <a:rPr lang="pt-BR" sz="1200" dirty="0"/>
               <a:t>#define N 1000</a:t>
             </a:r>
           </a:p>
@@ -8187,19 +8187,19 @@
               <a:buNone/>
             </a:pPr>
             <a:r>
-              <a:rPr lang="pt-BR" sz="1400" dirty="0" err="1"/>
+              <a:rPr lang="pt-BR" sz="1200" dirty="0" err="1"/>
               <a:t>int</a:t>
             </a:r>
             <a:r>
-              <a:rPr lang="pt-BR" sz="1400" dirty="0"/>
+              <a:rPr lang="pt-BR" sz="1200" dirty="0"/>
               <a:t> </a:t>
             </a:r>
             <a:r>
-              <a:rPr lang="pt-BR" sz="1400" dirty="0" err="1"/>
+              <a:rPr lang="pt-BR" sz="1200" dirty="0" err="1"/>
               <a:t>main</a:t>
             </a:r>
             <a:r>
-              <a:rPr lang="pt-BR" sz="1400" dirty="0"/>
+              <a:rPr lang="pt-BR" sz="1200" dirty="0"/>
               <a:t> () {</a:t>
             </a:r>
           </a:p>
@@ -8208,27 +8208,27 @@
               <a:buNone/>
             </a:pPr>
             <a:r>
-              <a:rPr lang="pt-BR" sz="1400" dirty="0" err="1"/>
+              <a:rPr lang="pt-BR" sz="1200" dirty="0" err="1"/>
               <a:t>int</a:t>
             </a:r>
             <a:r>
-              <a:rPr lang="pt-BR" sz="1400" dirty="0"/>
+              <a:rPr lang="pt-BR" sz="1200" dirty="0"/>
               <a:t> </a:t>
             </a:r>
             <a:r>
-              <a:rPr lang="pt-BR" sz="1400" dirty="0" err="1"/>
+              <a:rPr lang="pt-BR" sz="1200" dirty="0" err="1"/>
               <a:t>i</a:t>
             </a:r>
             <a:r>
-              <a:rPr lang="pt-BR" sz="1400" dirty="0"/>
+              <a:rPr lang="pt-BR" sz="1200" dirty="0"/>
               <a:t>, </a:t>
             </a:r>
             <a:r>
-              <a:rPr lang="pt-BR" sz="1400" dirty="0" err="1"/>
+              <a:rPr lang="pt-BR" sz="1200" dirty="0" err="1"/>
               <a:t>n</a:t>
             </a:r>
             <a:r>
-              <a:rPr lang="pt-BR" sz="1400" dirty="0"/>
+              <a:rPr lang="pt-BR" sz="1200" dirty="0"/>
               <a:t>=N;</a:t>
             </a:r>
           </a:p>
@@ -8237,27 +8237,27 @@
               <a:buNone/>
             </a:pPr>
             <a:r>
-              <a:rPr lang="pt-BR" sz="1400" dirty="0" err="1"/>
+              <a:rPr lang="pt-BR" sz="1200" dirty="0" err="1"/>
               <a:t>float</a:t>
             </a:r>
             <a:r>
-              <a:rPr lang="pt-BR" sz="1400" dirty="0"/>
+              <a:rPr lang="pt-BR" sz="1200" dirty="0"/>
               <a:t> a[N], </a:t>
             </a:r>
             <a:r>
-              <a:rPr lang="pt-BR" sz="1400" dirty="0" err="1"/>
+              <a:rPr lang="pt-BR" sz="1200" dirty="0" err="1"/>
               <a:t>b</a:t>
             </a:r>
             <a:r>
-              <a:rPr lang="pt-BR" sz="1400" dirty="0"/>
+              <a:rPr lang="pt-BR" sz="1200" dirty="0"/>
               <a:t>[N], </a:t>
             </a:r>
             <a:r>
-              <a:rPr lang="pt-BR" sz="1400" dirty="0" err="1"/>
+              <a:rPr lang="pt-BR" sz="1200" dirty="0" err="1"/>
               <a:t>c</a:t>
             </a:r>
             <a:r>
-              <a:rPr lang="pt-BR" sz="1400" dirty="0"/>
+              <a:rPr lang="pt-BR" sz="1200" dirty="0"/>
               <a:t>[N];</a:t>
             </a:r>
           </a:p>
@@ -8266,63 +8266,63 @@
               <a:buNone/>
             </a:pPr>
             <a:r>
-              <a:rPr lang="pt-BR" sz="1400" dirty="0"/>
+              <a:rPr lang="pt-BR" sz="1200" dirty="0"/>
               <a:t>for (</a:t>
             </a:r>
             <a:r>
-              <a:rPr lang="pt-BR" sz="1400" dirty="0" err="1"/>
+              <a:rPr lang="pt-BR" sz="1200" dirty="0" err="1"/>
               <a:t>i</a:t>
             </a:r>
             <a:r>
-              <a:rPr lang="pt-BR" sz="1400" dirty="0"/>
+              <a:rPr lang="pt-BR" sz="1200" dirty="0"/>
               <a:t>=0; </a:t>
             </a:r>
             <a:r>
-              <a:rPr lang="pt-BR" sz="1400" dirty="0" err="1"/>
+              <a:rPr lang="pt-BR" sz="1200" dirty="0" err="1"/>
               <a:t>i</a:t>
             </a:r>
             <a:r>
-              <a:rPr lang="pt-BR" sz="1400" dirty="0"/>
+              <a:rPr lang="pt-BR" sz="1200" dirty="0"/>
               <a:t> &lt; N; </a:t>
             </a:r>
             <a:r>
-              <a:rPr lang="pt-BR" sz="1400" dirty="0" err="1"/>
+              <a:rPr lang="pt-BR" sz="1200" dirty="0" err="1"/>
               <a:t>i</a:t>
             </a:r>
             <a:r>
-              <a:rPr lang="pt-BR" sz="1400" dirty="0"/>
+              <a:rPr lang="pt-BR" sz="1200" dirty="0"/>
               <a:t>++) a[</a:t>
             </a:r>
             <a:r>
-              <a:rPr lang="pt-BR" sz="1400" dirty="0" err="1"/>
+              <a:rPr lang="pt-BR" sz="1200" dirty="0" err="1"/>
               <a:t>i</a:t>
             </a:r>
             <a:r>
-              <a:rPr lang="pt-BR" sz="1400" dirty="0"/>
+              <a:rPr lang="pt-BR" sz="1200" dirty="0"/>
               <a:t>] = </a:t>
             </a:r>
             <a:r>
-              <a:rPr lang="pt-BR" sz="1400" dirty="0" err="1"/>
+              <a:rPr lang="pt-BR" sz="1200" dirty="0" err="1"/>
               <a:t>b</a:t>
             </a:r>
             <a:r>
-              <a:rPr lang="pt-BR" sz="1400" dirty="0"/>
+              <a:rPr lang="pt-BR" sz="1200" dirty="0"/>
               <a:t>[</a:t>
             </a:r>
             <a:r>
-              <a:rPr lang="pt-BR" sz="1400" dirty="0" err="1"/>
+              <a:rPr lang="pt-BR" sz="1200" dirty="0" err="1"/>
               <a:t>i</a:t>
             </a:r>
             <a:r>
-              <a:rPr lang="pt-BR" sz="1400" dirty="0"/>
+              <a:rPr lang="pt-BR" sz="1200" dirty="0"/>
               <a:t>] = </a:t>
             </a:r>
             <a:r>
-              <a:rPr lang="pt-BR" sz="1400" dirty="0" err="1"/>
+              <a:rPr lang="pt-BR" sz="1200" dirty="0" err="1"/>
               <a:t>i</a:t>
             </a:r>
             <a:r>
-              <a:rPr lang="pt-BR" sz="1400" dirty="0"/>
+              <a:rPr lang="pt-BR" sz="1200" dirty="0"/>
               <a:t> * 1.0;</a:t>
             </a:r>
           </a:p>
@@ -8331,7 +8331,7 @@
               <a:buNone/>
             </a:pPr>
             <a:r>
-              <a:rPr lang="pt-BR" sz="1400" dirty="0">
+              <a:rPr lang="pt-BR" sz="1200" dirty="0">
                 <a:solidFill>
                   <a:srgbClr val="002060"/>
                 </a:solidFill>
@@ -8339,7 +8339,7 @@
               <a:t>#</a:t>
             </a:r>
             <a:r>
-              <a:rPr lang="pt-BR" sz="1400" dirty="0" err="1">
+              <a:rPr lang="pt-BR" sz="1200" dirty="0" err="1">
                 <a:solidFill>
                   <a:srgbClr val="002060"/>
                 </a:solidFill>
@@ -8347,7 +8347,7 @@
               <a:t>pragma</a:t>
             </a:r>
             <a:r>
-              <a:rPr lang="pt-BR" sz="1400" dirty="0">
+              <a:rPr lang="pt-BR" sz="1200" dirty="0">
                 <a:solidFill>
                   <a:srgbClr val="002060"/>
                 </a:solidFill>
@@ -8355,7 +8355,7 @@
               <a:t> </a:t>
             </a:r>
             <a:r>
-              <a:rPr lang="pt-BR" sz="1400" dirty="0" err="1">
+              <a:rPr lang="pt-BR" sz="1200" dirty="0" err="1">
                 <a:solidFill>
                   <a:srgbClr val="002060"/>
                 </a:solidFill>
@@ -8363,7 +8363,7 @@
               <a:t>omp</a:t>
             </a:r>
             <a:r>
-              <a:rPr lang="pt-BR" sz="1400" dirty="0">
+              <a:rPr lang="pt-BR" sz="1200" dirty="0">
                 <a:solidFill>
                   <a:srgbClr val="002060"/>
                 </a:solidFill>
@@ -8371,7 +8371,7 @@
               <a:t> </a:t>
             </a:r>
             <a:r>
-              <a:rPr lang="pt-BR" sz="1400" dirty="0" err="1">
+              <a:rPr lang="pt-BR" sz="1200" dirty="0" err="1">
                 <a:solidFill>
                   <a:srgbClr val="002060"/>
                 </a:solidFill>
@@ -8379,7 +8379,7 @@
               <a:t>parallel</a:t>
             </a:r>
             <a:r>
-              <a:rPr lang="pt-BR" sz="1400" dirty="0">
+              <a:rPr lang="pt-BR" sz="1200" dirty="0">
                 <a:solidFill>
                   <a:srgbClr val="002060"/>
                 </a:solidFill>
@@ -8387,7 +8387,7 @@
               <a:t> </a:t>
             </a:r>
             <a:r>
-              <a:rPr lang="pt-BR" sz="1400" dirty="0" err="1">
+              <a:rPr lang="pt-BR" sz="1200" dirty="0" err="1">
                 <a:solidFill>
                   <a:srgbClr val="002060"/>
                 </a:solidFill>
@@ -8395,7 +8395,7 @@
               <a:t>shared</a:t>
             </a:r>
             <a:r>
-              <a:rPr lang="pt-BR" sz="1400" dirty="0">
+              <a:rPr lang="pt-BR" sz="1200" dirty="0">
                 <a:solidFill>
                   <a:srgbClr val="002060"/>
                 </a:solidFill>
@@ -8403,7 +8403,7 @@
               <a:t>(</a:t>
             </a:r>
             <a:r>
-              <a:rPr lang="pt-BR" sz="1400" dirty="0" err="1">
+              <a:rPr lang="pt-BR" sz="1200" dirty="0" err="1">
                 <a:solidFill>
                   <a:srgbClr val="002060"/>
                 </a:solidFill>
@@ -8411,7 +8411,7 @@
               <a:t>a,b,c,n</a:t>
             </a:r>
             <a:r>
-              <a:rPr lang="pt-BR" sz="1400" dirty="0">
+              <a:rPr lang="pt-BR" sz="1200" dirty="0">
                 <a:solidFill>
                   <a:srgbClr val="002060"/>
                 </a:solidFill>
@@ -8419,7 +8419,7 @@
               <a:t>) </a:t>
             </a:r>
             <a:r>
-              <a:rPr lang="pt-BR" sz="1400" dirty="0" err="1">
+              <a:rPr lang="pt-BR" sz="1200" dirty="0" err="1">
                 <a:solidFill>
                   <a:srgbClr val="002060"/>
                 </a:solidFill>
@@ -8427,7 +8427,7 @@
               <a:t>private</a:t>
             </a:r>
             <a:r>
-              <a:rPr lang="pt-BR" sz="1400" dirty="0">
+              <a:rPr lang="pt-BR" sz="1200" dirty="0">
                 <a:solidFill>
                   <a:srgbClr val="002060"/>
                 </a:solidFill>
@@ -8435,7 +8435,7 @@
               <a:t>(</a:t>
             </a:r>
             <a:r>
-              <a:rPr lang="pt-BR" sz="1400" dirty="0" err="1">
+              <a:rPr lang="pt-BR" sz="1200" dirty="0" err="1">
                 <a:solidFill>
                   <a:srgbClr val="002060"/>
                 </a:solidFill>
@@ -8443,12 +8443,12 @@
               <a:t>i</a:t>
             </a:r>
             <a:r>
-              <a:rPr lang="pt-BR" sz="1400" dirty="0">
+              <a:rPr lang="pt-BR" sz="1200" dirty="0">
                 <a:solidFill>
                   <a:srgbClr val="002060"/>
                 </a:solidFill>
               </a:rPr>
-              <a:t>) {</a:t>
+              <a:t>)</a:t>
             </a:r>
           </a:p>
           <a:p>
@@ -8456,15 +8456,28 @@
               <a:buNone/>
             </a:pPr>
             <a:r>
-              <a:rPr lang="pt-BR" sz="1400" dirty="0">
+              <a:rPr lang="pt-BR" sz="1200" dirty="0">
                 <a:solidFill>
                   <a:srgbClr val="002060"/>
                 </a:solidFill>
               </a:rPr>
-              <a:t>#</a:t>
-            </a:r>
-            <a:r>
-              <a:rPr lang="pt-BR" sz="1400" dirty="0" err="1">
+              <a:t>{</a:t>
+            </a:r>
+          </a:p>
+          <a:p>
+            <a:pPr marL="120650" indent="0">
+              <a:buNone/>
+            </a:pPr>
+            <a:r>
+              <a:rPr lang="pt-BR" sz="1200" dirty="0">
+                <a:solidFill>
+                  <a:srgbClr val="002060"/>
+                </a:solidFill>
+              </a:rPr>
+              <a:t>  #</a:t>
+            </a:r>
+            <a:r>
+              <a:rPr lang="pt-BR" sz="1200" dirty="0" err="1">
                 <a:solidFill>
                   <a:srgbClr val="002060"/>
                 </a:solidFill>
@@ -8472,7 +8485,7 @@
               <a:t>pragma</a:t>
             </a:r>
             <a:r>
-              <a:rPr lang="pt-BR" sz="1400" dirty="0">
+              <a:rPr lang="pt-BR" sz="1200" dirty="0">
                 <a:solidFill>
                   <a:srgbClr val="002060"/>
                 </a:solidFill>
@@ -8480,7 +8493,7 @@
               <a:t> </a:t>
             </a:r>
             <a:r>
-              <a:rPr lang="pt-BR" sz="1400" dirty="0" err="1">
+              <a:rPr lang="pt-BR" sz="1200" dirty="0" err="1">
                 <a:solidFill>
                   <a:srgbClr val="002060"/>
                 </a:solidFill>
@@ -8488,7 +8501,7 @@
               <a:t>omp</a:t>
             </a:r>
             <a:r>
-              <a:rPr lang="pt-BR" sz="1400" dirty="0">
+              <a:rPr lang="pt-BR" sz="1200" dirty="0">
                 <a:solidFill>
                   <a:srgbClr val="002060"/>
                 </a:solidFill>
@@ -8496,7 +8509,7 @@
               <a:t> </a:t>
             </a:r>
             <a:r>
-              <a:rPr lang="pt-BR" sz="1400" dirty="0" err="1">
+              <a:rPr lang="pt-BR" sz="1200" dirty="0" err="1">
                 <a:solidFill>
                   <a:srgbClr val="002060"/>
                 </a:solidFill>
@@ -8504,7 +8517,7 @@
               <a:t>sections</a:t>
             </a:r>
             <a:r>
-              <a:rPr lang="pt-BR" sz="1400" dirty="0">
+              <a:rPr lang="pt-BR" sz="1200" dirty="0">
                 <a:solidFill>
                   <a:srgbClr val="002060"/>
                 </a:solidFill>
@@ -8512,75 +8525,14 @@
               <a:t> </a:t>
             </a:r>
             <a:r>
-              <a:rPr lang="pt-BR" sz="1400" dirty="0" err="1">
+              <a:rPr lang="pt-BR" sz="1200" dirty="0" err="1">
                 <a:solidFill>
                   <a:srgbClr val="002060"/>
                 </a:solidFill>
               </a:rPr>
               <a:t>nowait</a:t>
             </a:r>
-            <a:r>
-              <a:rPr lang="pt-BR" sz="1400" dirty="0">
-                <a:solidFill>
-                  <a:srgbClr val="002060"/>
-                </a:solidFill>
-              </a:rPr>
-              <a:t> {</a:t>
-            </a:r>
-          </a:p>
-          <a:p>
-            <a:pPr marL="120650" indent="0">
-              <a:buNone/>
-            </a:pPr>
-            <a:r>
-              <a:rPr lang="pt-BR" sz="1400" dirty="0">
-                <a:solidFill>
-                  <a:srgbClr val="002060"/>
-                </a:solidFill>
-              </a:rPr>
-              <a:t>#</a:t>
-            </a:r>
-            <a:r>
-              <a:rPr lang="pt-BR" sz="1400" dirty="0" err="1">
-                <a:solidFill>
-                  <a:srgbClr val="002060"/>
-                </a:solidFill>
-              </a:rPr>
-              <a:t>pragma</a:t>
-            </a:r>
-            <a:r>
-              <a:rPr lang="pt-BR" sz="1400" dirty="0">
-                <a:solidFill>
-                  <a:srgbClr val="002060"/>
-                </a:solidFill>
-              </a:rPr>
-              <a:t> </a:t>
-            </a:r>
-            <a:r>
-              <a:rPr lang="pt-BR" sz="1400" dirty="0" err="1">
-                <a:solidFill>
-                  <a:srgbClr val="002060"/>
-                </a:solidFill>
-              </a:rPr>
-              <a:t>omp</a:t>
-            </a:r>
-            <a:r>
-              <a:rPr lang="pt-BR" sz="1400" dirty="0">
-                <a:solidFill>
-                  <a:srgbClr val="002060"/>
-                </a:solidFill>
-              </a:rPr>
-              <a:t> </a:t>
-            </a:r>
-            <a:r>
-              <a:rPr lang="pt-BR" sz="1400" dirty="0" err="1">
-                <a:solidFill>
-                  <a:srgbClr val="002060"/>
-                </a:solidFill>
-              </a:rPr>
-              <a:t>section</a:t>
-            </a:r>
-            <a:endParaRPr lang="pt-BR" sz="1400" dirty="0">
+            <a:endParaRPr lang="pt-BR" sz="1200" dirty="0">
               <a:solidFill>
                 <a:srgbClr val="002060"/>
               </a:solidFill>
@@ -8591,40 +8543,12 @@
               <a:buNone/>
             </a:pPr>
             <a:r>
-              <a:rPr lang="pt-BR" sz="1400" dirty="0"/>
-              <a:t>for (</a:t>
-            </a:r>
-            <a:r>
-              <a:rPr lang="pt-BR" sz="1400" dirty="0" err="1"/>
-              <a:t>i</a:t>
-            </a:r>
-            <a:r>
-              <a:rPr lang="pt-BR" sz="1400" dirty="0"/>
-              <a:t>=0; </a:t>
-            </a:r>
-            <a:r>
-              <a:rPr lang="pt-BR" sz="1400" dirty="0" err="1"/>
-              <a:t>i</a:t>
-            </a:r>
-            <a:r>
-              <a:rPr lang="pt-BR" sz="1400" dirty="0"/>
-              <a:t> &lt; </a:t>
-            </a:r>
-            <a:r>
-              <a:rPr lang="pt-BR" sz="1400" dirty="0" err="1"/>
-              <a:t>n</a:t>
-            </a:r>
-            <a:r>
-              <a:rPr lang="pt-BR" sz="1400" dirty="0"/>
-              <a:t>/2; </a:t>
-            </a:r>
-            <a:r>
-              <a:rPr lang="pt-BR" sz="1400" dirty="0" err="1"/>
-              <a:t>i</a:t>
-            </a:r>
-            <a:r>
-              <a:rPr lang="pt-BR" sz="1400" dirty="0"/>
-              <a:t>++)</a:t>
+              <a:rPr lang="pt-BR" sz="1200" dirty="0">
+                <a:solidFill>
+                  <a:srgbClr val="002060"/>
+                </a:solidFill>
+              </a:rPr>
+              <a:t>  {</a:t>
             </a:r>
           </a:p>
           <a:p>
@@ -8632,64 +8556,15 @@
               <a:buNone/>
             </a:pPr>
             <a:r>
-              <a:rPr lang="pt-BR" sz="1400" dirty="0"/>
-              <a:t>       </a:t>
-            </a:r>
-            <a:r>
-              <a:rPr lang="pt-BR" sz="1400" dirty="0" err="1"/>
-              <a:t>c</a:t>
-            </a:r>
-            <a:r>
-              <a:rPr lang="pt-BR" sz="1400" dirty="0"/>
-              <a:t>[</a:t>
-            </a:r>
-            <a:r>
-              <a:rPr lang="pt-BR" sz="1400" dirty="0" err="1"/>
-              <a:t>i</a:t>
-            </a:r>
-            <a:r>
-              <a:rPr lang="pt-BR" sz="1400" dirty="0"/>
-              <a:t>] = a[</a:t>
-            </a:r>
-            <a:r>
-              <a:rPr lang="pt-BR" sz="1400" dirty="0" err="1"/>
-              <a:t>i</a:t>
-            </a:r>
-            <a:r>
-              <a:rPr lang="pt-BR" sz="1400" dirty="0"/>
-              <a:t>] + </a:t>
-            </a:r>
-            <a:r>
-              <a:rPr lang="pt-BR" sz="1400" dirty="0" err="1"/>
-              <a:t>b</a:t>
-            </a:r>
-            <a:r>
-              <a:rPr lang="pt-BR" sz="1400" dirty="0"/>
-              <a:t>[</a:t>
-            </a:r>
-            <a:r>
-              <a:rPr lang="pt-BR" sz="1400" dirty="0" err="1"/>
-              <a:t>i</a:t>
-            </a:r>
-            <a:r>
-              <a:rPr lang="pt-BR" sz="1400" dirty="0"/>
-              <a:t>];</a:t>
-            </a:r>
-          </a:p>
-          <a:p>
-            <a:pPr marL="120650" indent="0">
-              <a:buNone/>
-            </a:pPr>
-            <a:r>
-              <a:rPr lang="pt-BR" sz="1400" dirty="0">
+              <a:rPr lang="pt-BR" sz="1200" dirty="0">
                 <a:solidFill>
                   <a:srgbClr val="002060"/>
                 </a:solidFill>
               </a:rPr>
-              <a:t>#</a:t>
-            </a:r>
-            <a:r>
-              <a:rPr lang="pt-BR" sz="1400" dirty="0" err="1">
+              <a:t>    #</a:t>
+            </a:r>
+            <a:r>
+              <a:rPr lang="pt-BR" sz="1200" dirty="0" err="1">
                 <a:solidFill>
                   <a:srgbClr val="002060"/>
                 </a:solidFill>
@@ -8697,7 +8572,7 @@
               <a:t>pragma</a:t>
             </a:r>
             <a:r>
-              <a:rPr lang="pt-BR" sz="1400" dirty="0">
+              <a:rPr lang="pt-BR" sz="1200" dirty="0">
                 <a:solidFill>
                   <a:srgbClr val="002060"/>
                 </a:solidFill>
@@ -8705,7 +8580,7 @@
               <a:t> </a:t>
             </a:r>
             <a:r>
-              <a:rPr lang="pt-BR" sz="1400" dirty="0" err="1">
+              <a:rPr lang="pt-BR" sz="1200" dirty="0" err="1">
                 <a:solidFill>
                   <a:srgbClr val="002060"/>
                 </a:solidFill>
@@ -8713,7 +8588,7 @@
               <a:t>omp</a:t>
             </a:r>
             <a:r>
-              <a:rPr lang="pt-BR" sz="1400" dirty="0">
+              <a:rPr lang="pt-BR" sz="1200" dirty="0">
                 <a:solidFill>
                   <a:srgbClr val="002060"/>
                 </a:solidFill>
@@ -8721,14 +8596,14 @@
               <a:t> </a:t>
             </a:r>
             <a:r>
-              <a:rPr lang="pt-BR" sz="1400" dirty="0" err="1">
+              <a:rPr lang="pt-BR" sz="1200" dirty="0" err="1">
                 <a:solidFill>
                   <a:srgbClr val="002060"/>
                 </a:solidFill>
               </a:rPr>
               <a:t>section</a:t>
             </a:r>
-            <a:endParaRPr lang="pt-BR" sz="1400" dirty="0">
+            <a:endParaRPr lang="pt-BR" sz="1200" dirty="0">
               <a:solidFill>
                 <a:srgbClr val="002060"/>
               </a:solidFill>
@@ -8739,47 +8614,39 @@
               <a:buNone/>
             </a:pPr>
             <a:r>
-              <a:rPr lang="pt-BR" sz="1400" dirty="0"/>
-              <a:t>for (</a:t>
-            </a:r>
-            <a:r>
-              <a:rPr lang="pt-BR" sz="1400" dirty="0" err="1"/>
+              <a:rPr lang="pt-BR" sz="1200" dirty="0"/>
+              <a:t>     for (</a:t>
+            </a:r>
+            <a:r>
+              <a:rPr lang="pt-BR" sz="1200" dirty="0" err="1"/>
               <a:t>i</a:t>
             </a:r>
             <a:r>
-              <a:rPr lang="pt-BR" sz="1400" dirty="0"/>
-              <a:t>=</a:t>
-            </a:r>
-            <a:r>
-              <a:rPr lang="pt-BR" sz="1400" dirty="0" err="1"/>
+              <a:rPr lang="pt-BR" sz="1200" dirty="0"/>
+              <a:t>=0; </a:t>
+            </a:r>
+            <a:r>
+              <a:rPr lang="pt-BR" sz="1200" dirty="0" err="1"/>
+              <a:t>i</a:t>
+            </a:r>
+            <a:r>
+              <a:rPr lang="pt-BR" sz="1200" dirty="0"/>
+              <a:t> &lt; </a:t>
+            </a:r>
+            <a:r>
+              <a:rPr lang="pt-BR" sz="1200" dirty="0" err="1"/>
               <a:t>n</a:t>
             </a:r>
             <a:r>
-              <a:rPr lang="pt-BR" sz="1400" dirty="0"/>
+              <a:rPr lang="pt-BR" sz="1200" dirty="0"/>
               <a:t>/2; </a:t>
             </a:r>
             <a:r>
-              <a:rPr lang="pt-BR" sz="1400" dirty="0" err="1"/>
+              <a:rPr lang="pt-BR" sz="1200" dirty="0" err="1"/>
               <a:t>i</a:t>
             </a:r>
             <a:r>
-              <a:rPr lang="pt-BR" sz="1400" dirty="0"/>
-              <a:t> &lt; </a:t>
-            </a:r>
-            <a:r>
-              <a:rPr lang="pt-BR" sz="1400" dirty="0" err="1"/>
-              <a:t>n</a:t>
-            </a:r>
-            <a:r>
-              <a:rPr lang="pt-BR" sz="1400" dirty="0"/>
-              <a:t>; </a:t>
-            </a:r>
-            <a:r>
-              <a:rPr lang="pt-BR" sz="1400" dirty="0" err="1"/>
-              <a:t>i</a:t>
-            </a:r>
-            <a:r>
-              <a:rPr lang="pt-BR" sz="1400" dirty="0"/>
+              <a:rPr lang="pt-BR" sz="1200" dirty="0"/>
               <a:t>++)</a:t>
             </a:r>
           </a:p>
@@ -8788,47 +8655,47 @@
               <a:buNone/>
             </a:pPr>
             <a:r>
-              <a:rPr lang="pt-BR" sz="1400" dirty="0"/>
-              <a:t>	</a:t>
-            </a:r>
-            <a:r>
-              <a:rPr lang="pt-BR" sz="1400" dirty="0" err="1"/>
+              <a:rPr lang="pt-BR" sz="1200" dirty="0"/>
+              <a:t>        </a:t>
+            </a:r>
+            <a:r>
+              <a:rPr lang="pt-BR" sz="1200" dirty="0" err="1"/>
               <a:t>c</a:t>
             </a:r>
             <a:r>
-              <a:rPr lang="pt-BR" sz="1400" dirty="0"/>
+              <a:rPr lang="pt-BR" sz="1200" dirty="0"/>
               <a:t>[</a:t>
             </a:r>
             <a:r>
-              <a:rPr lang="pt-BR" sz="1400" dirty="0" err="1"/>
+              <a:rPr lang="pt-BR" sz="1200" dirty="0" err="1"/>
               <a:t>i</a:t>
             </a:r>
             <a:r>
-              <a:rPr lang="pt-BR" sz="1400" dirty="0"/>
+              <a:rPr lang="pt-BR" sz="1200" dirty="0"/>
               <a:t>] = a[</a:t>
             </a:r>
             <a:r>
-              <a:rPr lang="pt-BR" sz="1400" dirty="0" err="1"/>
+              <a:rPr lang="pt-BR" sz="1200" dirty="0" err="1"/>
               <a:t>i</a:t>
             </a:r>
             <a:r>
-              <a:rPr lang="pt-BR" sz="1400" dirty="0"/>
+              <a:rPr lang="pt-BR" sz="1200" dirty="0"/>
               <a:t>] + </a:t>
             </a:r>
             <a:r>
-              <a:rPr lang="pt-BR" sz="1400" dirty="0" err="1"/>
+              <a:rPr lang="pt-BR" sz="1200" dirty="0" err="1"/>
               <a:t>b</a:t>
             </a:r>
             <a:r>
-              <a:rPr lang="pt-BR" sz="1400" dirty="0"/>
+              <a:rPr lang="pt-BR" sz="1200" dirty="0"/>
               <a:t>[</a:t>
             </a:r>
             <a:r>
-              <a:rPr lang="pt-BR" sz="1400" dirty="0" err="1"/>
+              <a:rPr lang="pt-BR" sz="1200" dirty="0" err="1"/>
               <a:t>i</a:t>
             </a:r>
             <a:r>
-              <a:rPr lang="pt-BR" sz="1400" dirty="0"/>
+              <a:rPr lang="pt-BR" sz="1200" dirty="0"/>
               <a:t>];</a:t>
             </a:r>
           </a:p>
@@ -8837,25 +8704,106 @@
               <a:buNone/>
             </a:pPr>
             <a:r>
-              <a:rPr lang="pt-BR" sz="1400" dirty="0"/>
-              <a:t>} /* fim seções*/</a:t>
-            </a:r>
+              <a:rPr lang="pt-BR" sz="1200" dirty="0">
+                <a:solidFill>
+                  <a:srgbClr val="002060"/>
+                </a:solidFill>
+              </a:rPr>
+              <a:t>     #</a:t>
+            </a:r>
+            <a:r>
+              <a:rPr lang="pt-BR" sz="1200" dirty="0" err="1">
+                <a:solidFill>
+                  <a:srgbClr val="002060"/>
+                </a:solidFill>
+              </a:rPr>
+              <a:t>pragma</a:t>
+            </a:r>
+            <a:r>
+              <a:rPr lang="pt-BR" sz="1200" dirty="0">
+                <a:solidFill>
+                  <a:srgbClr val="002060"/>
+                </a:solidFill>
+              </a:rPr>
+              <a:t> </a:t>
+            </a:r>
+            <a:r>
+              <a:rPr lang="pt-BR" sz="1200" dirty="0" err="1">
+                <a:solidFill>
+                  <a:srgbClr val="002060"/>
+                </a:solidFill>
+              </a:rPr>
+              <a:t>omp</a:t>
+            </a:r>
+            <a:r>
+              <a:rPr lang="pt-BR" sz="1200" dirty="0">
+                <a:solidFill>
+                  <a:srgbClr val="002060"/>
+                </a:solidFill>
+              </a:rPr>
+              <a:t> </a:t>
+            </a:r>
+            <a:r>
+              <a:rPr lang="pt-BR" sz="1200" dirty="0" err="1">
+                <a:solidFill>
+                  <a:srgbClr val="002060"/>
+                </a:solidFill>
+              </a:rPr>
+              <a:t>section</a:t>
+            </a:r>
+            <a:endParaRPr lang="pt-BR" sz="1200" dirty="0">
+              <a:solidFill>
+                <a:srgbClr val="002060"/>
+              </a:solidFill>
+            </a:endParaRPr>
           </a:p>
           <a:p>
             <a:pPr marL="120650" indent="0">
               <a:buNone/>
             </a:pPr>
             <a:r>
-              <a:rPr lang="pt-BR" sz="1400" dirty="0"/>
-              <a:t>} /* fim </a:t>
-            </a:r>
-            <a:r>
-              <a:rPr lang="pt-BR" sz="1400" dirty="0" err="1"/>
-              <a:t>parallel</a:t>
-            </a:r>
-            <a:r>
-              <a:rPr lang="pt-BR" sz="1400" dirty="0"/>
-              <a:t> */</a:t>
+              <a:rPr lang="pt-BR" sz="1200" dirty="0"/>
+              <a:t>     for (</a:t>
+            </a:r>
+            <a:r>
+              <a:rPr lang="pt-BR" sz="1200" dirty="0" err="1"/>
+              <a:t>i</a:t>
+            </a:r>
+            <a:r>
+              <a:rPr lang="pt-BR" sz="1200" dirty="0"/>
+              <a:t>=</a:t>
+            </a:r>
+            <a:r>
+              <a:rPr lang="pt-BR" sz="1200" dirty="0" err="1"/>
+              <a:t>n</a:t>
+            </a:r>
+            <a:r>
+              <a:rPr lang="pt-BR" sz="1200" dirty="0"/>
+              <a:t>/2; </a:t>
+            </a:r>
+            <a:r>
+              <a:rPr lang="pt-BR" sz="1200" dirty="0" err="1"/>
+              <a:t>i</a:t>
+            </a:r>
+            <a:r>
+              <a:rPr lang="pt-BR" sz="1200" dirty="0"/>
+              <a:t> &lt; </a:t>
+            </a:r>
+            <a:r>
+              <a:rPr lang="pt-BR" sz="1200" dirty="0" err="1"/>
+              <a:t>n</a:t>
+            </a:r>
+            <a:r>
+              <a:rPr lang="pt-BR" sz="1200" dirty="0"/>
+              <a:t>; </a:t>
+            </a:r>
+            <a:r>
+              <a:rPr lang="pt-BR" sz="1200" dirty="0" err="1"/>
+              <a:t>i</a:t>
+            </a:r>
+            <a:r>
+              <a:rPr lang="pt-BR" sz="1200" dirty="0"/>
+              <a:t>++)</a:t>
             </a:r>
           </a:p>
           <a:p>
@@ -8863,7 +8811,86 @@
               <a:buNone/>
             </a:pPr>
             <a:r>
-              <a:rPr lang="pt-BR" sz="1400" dirty="0"/>
+              <a:rPr lang="pt-BR" sz="1200" dirty="0"/>
+              <a:t>        </a:t>
+            </a:r>
+            <a:r>
+              <a:rPr lang="pt-BR" sz="1200" dirty="0" err="1"/>
+              <a:t>c</a:t>
+            </a:r>
+            <a:r>
+              <a:rPr lang="pt-BR" sz="1200" dirty="0"/>
+              <a:t>[</a:t>
+            </a:r>
+            <a:r>
+              <a:rPr lang="pt-BR" sz="1200" dirty="0" err="1"/>
+              <a:t>i</a:t>
+            </a:r>
+            <a:r>
+              <a:rPr lang="pt-BR" sz="1200" dirty="0"/>
+              <a:t>] = a[</a:t>
+            </a:r>
+            <a:r>
+              <a:rPr lang="pt-BR" sz="1200" dirty="0" err="1"/>
+              <a:t>i</a:t>
+            </a:r>
+            <a:r>
+              <a:rPr lang="pt-BR" sz="1200" dirty="0"/>
+              <a:t>] + </a:t>
+            </a:r>
+            <a:r>
+              <a:rPr lang="pt-BR" sz="1200" dirty="0" err="1"/>
+              <a:t>b</a:t>
+            </a:r>
+            <a:r>
+              <a:rPr lang="pt-BR" sz="1200" dirty="0"/>
+              <a:t>[</a:t>
+            </a:r>
+            <a:r>
+              <a:rPr lang="pt-BR" sz="1200" dirty="0" err="1"/>
+              <a:t>i</a:t>
+            </a:r>
+            <a:r>
+              <a:rPr lang="pt-BR" sz="1200" dirty="0"/>
+              <a:t>];</a:t>
+            </a:r>
+          </a:p>
+          <a:p>
+            <a:pPr marL="120650" indent="0">
+              <a:buNone/>
+            </a:pPr>
+            <a:r>
+              <a:rPr lang="pt-BR" sz="1200"/>
+              <a:t>    </a:t>
+            </a:r>
+            <a:r>
+              <a:rPr lang="pt-BR" sz="1200" dirty="0"/>
+              <a:t>} /* fim seções*/</a:t>
+            </a:r>
+          </a:p>
+          <a:p>
+            <a:pPr marL="120650" indent="0">
+              <a:buNone/>
+            </a:pPr>
+            <a:r>
+              <a:rPr lang="pt-BR" sz="1200" dirty="0"/>
+              <a:t>  } /* fim </a:t>
+            </a:r>
+            <a:r>
+              <a:rPr lang="pt-BR" sz="1200" dirty="0" err="1"/>
+              <a:t>parallel</a:t>
+            </a:r>
+            <a:r>
+              <a:rPr lang="pt-BR" sz="1200" dirty="0"/>
+              <a:t> */</a:t>
+            </a:r>
+          </a:p>
+          <a:p>
+            <a:pPr marL="120650" indent="0">
+              <a:buNone/>
+            </a:pPr>
+            <a:r>
+              <a:rPr lang="pt-BR" sz="1200" dirty="0"/>
               <a:t>}</a:t>
             </a:r>
           </a:p>

</xml_diff>